<commit_message>
Actualizada la presentación y mejoras en los layouts
</commit_message>
<xml_diff>
--- a/Presentación - Club Padel.pptx
+++ b/Presentación - Club Padel.pptx
@@ -25795,18 +25795,9 @@
   <p:clrMapOvr>
     <a:masterClrMapping/>
   </p:clrMapOvr>
-  <mc:AlternateContent xmlns:mc="http://schemas.openxmlformats.org/markup-compatibility/2006" xmlns:p14="http://schemas.microsoft.com/office/powerpoint/2010/main">
-    <mc:Choice Requires="p14">
-      <p:transition spd="med" p14:dur="700">
-        <p:fade/>
-      </p:transition>
-    </mc:Choice>
-    <mc:Fallback xmlns="">
-      <p:transition spd="med">
-        <p:fade/>
-      </p:transition>
-    </mc:Fallback>
-  </mc:AlternateContent>
+  <p:transition spd="slow">
+    <p:wipe/>
+  </p:transition>
 </p:sld>
 </file>
 
@@ -26036,18 +26027,9 @@
   <p:clrMapOvr>
     <a:masterClrMapping/>
   </p:clrMapOvr>
-  <mc:AlternateContent xmlns:mc="http://schemas.openxmlformats.org/markup-compatibility/2006" xmlns:p14="http://schemas.microsoft.com/office/powerpoint/2010/main">
-    <mc:Choice Requires="p14">
-      <p:transition spd="med" p14:dur="700">
-        <p:fade/>
-      </p:transition>
-    </mc:Choice>
-    <mc:Fallback xmlns="">
-      <p:transition spd="med">
-        <p:fade/>
-      </p:transition>
-    </mc:Fallback>
-  </mc:AlternateContent>
+  <p:transition spd="slow">
+    <p:wipe/>
+  </p:transition>
 </p:sld>
 </file>
 
@@ -26128,66 +26110,6 @@
       </p:sp>
       <p:pic>
         <p:nvPicPr>
-          <p:cNvPr id="45" name="Imagen 44">
-            <a:extLst>
-              <a:ext uri="{FF2B5EF4-FFF2-40B4-BE49-F238E27FC236}">
-                <a16:creationId xmlns:a16="http://schemas.microsoft.com/office/drawing/2014/main" id="{2B0E4F55-2D91-4886-ADD3-23FC8F3B8906}"/>
-              </a:ext>
-            </a:extLst>
-          </p:cNvPr>
-          <p:cNvPicPr>
-            <a:picLocks noChangeAspect="1"/>
-          </p:cNvPicPr>
-          <p:nvPr/>
-        </p:nvPicPr>
-        <p:blipFill>
-          <a:blip r:embed="rId2"/>
-          <a:stretch>
-            <a:fillRect/>
-          </a:stretch>
-        </p:blipFill>
-        <p:spPr>
-          <a:xfrm>
-            <a:off x="2730408" y="1457015"/>
-            <a:ext cx="2191319" cy="4653023"/>
-          </a:xfrm>
-          <a:prstGeom prst="rect">
-            <a:avLst/>
-          </a:prstGeom>
-        </p:spPr>
-      </p:pic>
-      <p:pic>
-        <p:nvPicPr>
-          <p:cNvPr id="55" name="Imagen 54">
-            <a:extLst>
-              <a:ext uri="{FF2B5EF4-FFF2-40B4-BE49-F238E27FC236}">
-                <a16:creationId xmlns:a16="http://schemas.microsoft.com/office/drawing/2014/main" id="{4BD5B1D6-B330-4477-8F37-DCBB57D1A87B}"/>
-              </a:ext>
-            </a:extLst>
-          </p:cNvPr>
-          <p:cNvPicPr>
-            <a:picLocks noChangeAspect="1"/>
-          </p:cNvPicPr>
-          <p:nvPr/>
-        </p:nvPicPr>
-        <p:blipFill>
-          <a:blip r:embed="rId3"/>
-          <a:stretch>
-            <a:fillRect/>
-          </a:stretch>
-        </p:blipFill>
-        <p:spPr>
-          <a:xfrm>
-            <a:off x="7294152" y="1457017"/>
-            <a:ext cx="2187284" cy="4653023"/>
-          </a:xfrm>
-          <a:prstGeom prst="rect">
-            <a:avLst/>
-          </a:prstGeom>
-        </p:spPr>
-      </p:pic>
-      <p:pic>
-        <p:nvPicPr>
           <p:cNvPr id="59" name="Imagen 58">
             <a:extLst>
               <a:ext uri="{FF2B5EF4-FFF2-40B4-BE49-F238E27FC236}">
@@ -26201,7 +26123,7 @@
           <p:nvPr/>
         </p:nvPicPr>
         <p:blipFill>
-          <a:blip r:embed="rId4"/>
+          <a:blip r:embed="rId2"/>
           <a:stretch>
             <a:fillRect/>
           </a:stretch>
@@ -26231,7 +26153,7 @@
           <p:nvPr/>
         </p:nvPicPr>
         <p:blipFill>
-          <a:blip r:embed="rId5"/>
+          <a:blip r:embed="rId3"/>
           <a:stretch>
             <a:fillRect/>
           </a:stretch>
@@ -26261,7 +26183,7 @@
           <p:nvPr/>
         </p:nvPicPr>
         <p:blipFill>
-          <a:blip r:embed="rId6"/>
+          <a:blip r:embed="rId4"/>
           <a:stretch>
             <a:fillRect/>
           </a:stretch>
@@ -26270,6 +26192,66 @@
           <a:xfrm>
             <a:off x="9571989" y="1478142"/>
             <a:ext cx="2187284" cy="4631895"/>
+          </a:xfrm>
+          <a:prstGeom prst="rect">
+            <a:avLst/>
+          </a:prstGeom>
+        </p:spPr>
+      </p:pic>
+      <p:pic>
+        <p:nvPicPr>
+          <p:cNvPr id="5" name="Imagen 4">
+            <a:extLst>
+              <a:ext uri="{FF2B5EF4-FFF2-40B4-BE49-F238E27FC236}">
+                <a16:creationId xmlns:a16="http://schemas.microsoft.com/office/drawing/2014/main" id="{53352B5A-F75B-45C5-93DD-DEBEA9E03C9F}"/>
+              </a:ext>
+            </a:extLst>
+          </p:cNvPr>
+          <p:cNvPicPr>
+            <a:picLocks noChangeAspect="1"/>
+          </p:cNvPicPr>
+          <p:nvPr/>
+        </p:nvPicPr>
+        <p:blipFill>
+          <a:blip r:embed="rId5"/>
+          <a:stretch>
+            <a:fillRect/>
+          </a:stretch>
+        </p:blipFill>
+        <p:spPr>
+          <a:xfrm>
+            <a:off x="2729456" y="1457013"/>
+            <a:ext cx="2193222" cy="4653024"/>
+          </a:xfrm>
+          <a:prstGeom prst="rect">
+            <a:avLst/>
+          </a:prstGeom>
+        </p:spPr>
+      </p:pic>
+      <p:pic>
+        <p:nvPicPr>
+          <p:cNvPr id="9" name="Imagen 8">
+            <a:extLst>
+              <a:ext uri="{FF2B5EF4-FFF2-40B4-BE49-F238E27FC236}">
+                <a16:creationId xmlns:a16="http://schemas.microsoft.com/office/drawing/2014/main" id="{A9A5B1F4-CDC1-4EA3-AD1E-AD5D70021CBB}"/>
+              </a:ext>
+            </a:extLst>
+          </p:cNvPr>
+          <p:cNvPicPr>
+            <a:picLocks noChangeAspect="1"/>
+          </p:cNvPicPr>
+          <p:nvPr/>
+        </p:nvPicPr>
+        <p:blipFill>
+          <a:blip r:embed="rId6"/>
+          <a:stretch>
+            <a:fillRect/>
+          </a:stretch>
+        </p:blipFill>
+        <p:spPr>
+          <a:xfrm>
+            <a:off x="7291068" y="1457013"/>
+            <a:ext cx="2191319" cy="4653023"/>
           </a:xfrm>
           <a:prstGeom prst="rect">
             <a:avLst/>
@@ -26286,18 +26268,9 @@
   <p:clrMapOvr>
     <a:masterClrMapping/>
   </p:clrMapOvr>
-  <mc:AlternateContent xmlns:mc="http://schemas.openxmlformats.org/markup-compatibility/2006" xmlns:p14="http://schemas.microsoft.com/office/powerpoint/2010/main">
-    <mc:Choice Requires="p14">
-      <p:transition spd="med" p14:dur="700">
-        <p:fade/>
-      </p:transition>
-    </mc:Choice>
-    <mc:Fallback xmlns="">
-      <p:transition spd="med">
-        <p:fade/>
-      </p:transition>
-    </mc:Fallback>
-  </mc:AlternateContent>
+  <p:transition spd="slow">
+    <p:wipe/>
+  </p:transition>
 </p:sld>
 </file>
 
@@ -26439,18 +26412,9 @@
   <p:clrMapOvr>
     <a:masterClrMapping/>
   </p:clrMapOvr>
-  <mc:AlternateContent xmlns:mc="http://schemas.openxmlformats.org/markup-compatibility/2006" xmlns:p14="http://schemas.microsoft.com/office/powerpoint/2010/main">
-    <mc:Choice Requires="p14">
-      <p:transition spd="med" p14:dur="700">
-        <p:fade/>
-      </p:transition>
-    </mc:Choice>
-    <mc:Fallback xmlns="">
-      <p:transition spd="med">
-        <p:fade/>
-      </p:transition>
-    </mc:Fallback>
-  </mc:AlternateContent>
+  <p:transition spd="slow">
+    <p:wipe/>
+  </p:transition>
 </p:sld>
 </file>
 
@@ -26539,18 +26503,9 @@
   <p:clrMapOvr>
     <a:masterClrMapping/>
   </p:clrMapOvr>
-  <mc:AlternateContent xmlns:mc="http://schemas.openxmlformats.org/markup-compatibility/2006" xmlns:p14="http://schemas.microsoft.com/office/powerpoint/2010/main">
-    <mc:Choice Requires="p14">
-      <p:transition spd="med" p14:dur="700">
-        <p:fade/>
-      </p:transition>
-    </mc:Choice>
-    <mc:Fallback xmlns="">
-      <p:transition spd="med">
-        <p:fade/>
-      </p:transition>
-    </mc:Fallback>
-  </mc:AlternateContent>
+  <p:transition spd="slow">
+    <p:wipe/>
+  </p:transition>
 </p:sld>
 </file>
 
@@ -27424,12 +27379,11 @@
 </file>
 
 <file path=customXml/item1.xml><?xml version="1.0" encoding="utf-8"?>
-<?mso-contentType ?>
-<FormTemplates xmlns="http://schemas.microsoft.com/sharepoint/v3/contenttype/forms">
-  <Display>DocumentLibraryForm</Display>
-  <Edit>DocumentLibraryForm</Edit>
-  <New>DocumentLibraryForm</New>
-</FormTemplates>
+<p:properties xmlns:p="http://schemas.microsoft.com/office/2006/metadata/properties" xmlns:xsi="http://www.w3.org/2001/XMLSchema-instance" xmlns:pc="http://schemas.microsoft.com/office/infopath/2007/PartnerControls">
+  <documentManagement>
+    <MediaServiceKeyPoints xmlns="71af3243-3dd4-4a8d-8c0d-dd76da1f02a5" xsi:nil="true"/>
+  </documentManagement>
+</p:properties>
 </file>
 
 <file path=customXml/item2.xml><?xml version="1.0" encoding="utf-8"?>
@@ -27644,17 +27598,20 @@
 </file>
 
 <file path=customXml/item3.xml><?xml version="1.0" encoding="utf-8"?>
-<p:properties xmlns:p="http://schemas.microsoft.com/office/2006/metadata/properties" xmlns:xsi="http://www.w3.org/2001/XMLSchema-instance" xmlns:pc="http://schemas.microsoft.com/office/infopath/2007/PartnerControls">
-  <documentManagement>
-    <MediaServiceKeyPoints xmlns="71af3243-3dd4-4a8d-8c0d-dd76da1f02a5" xsi:nil="true"/>
-  </documentManagement>
-</p:properties>
+<?mso-contentType ?>
+<FormTemplates xmlns="http://schemas.microsoft.com/sharepoint/v3/contenttype/forms">
+  <Display>DocumentLibraryForm</Display>
+  <Edit>DocumentLibraryForm</Edit>
+  <New>DocumentLibraryForm</New>
+</FormTemplates>
 </file>
 
 <file path=customXml/itemProps1.xml><?xml version="1.0" encoding="utf-8"?>
-<ds:datastoreItem xmlns:ds="http://schemas.openxmlformats.org/officeDocument/2006/customXml" ds:itemID="{5B26E0C9-B2AA-42E6-97B6-E1B7D9EAF129}">
+<ds:datastoreItem xmlns:ds="http://schemas.openxmlformats.org/officeDocument/2006/customXml" ds:itemID="{F5757914-1161-4661-9696-421FD6935CDD}">
   <ds:schemaRefs>
-    <ds:schemaRef ds:uri="http://schemas.microsoft.com/sharepoint/v3/contenttype/forms"/>
+    <ds:schemaRef ds:uri="http://schemas.microsoft.com/office/2006/metadata/properties"/>
+    <ds:schemaRef ds:uri="http://schemas.microsoft.com/office/infopath/2007/PartnerControls"/>
+    <ds:schemaRef ds:uri="71af3243-3dd4-4a8d-8c0d-dd76da1f02a5"/>
   </ds:schemaRefs>
 </ds:datastoreItem>
 </file>
@@ -27679,11 +27636,9 @@
 </file>
 
 <file path=customXml/itemProps3.xml><?xml version="1.0" encoding="utf-8"?>
-<ds:datastoreItem xmlns:ds="http://schemas.openxmlformats.org/officeDocument/2006/customXml" ds:itemID="{F5757914-1161-4661-9696-421FD6935CDD}">
+<ds:datastoreItem xmlns:ds="http://schemas.openxmlformats.org/officeDocument/2006/customXml" ds:itemID="{5B26E0C9-B2AA-42E6-97B6-E1B7D9EAF129}">
   <ds:schemaRefs>
-    <ds:schemaRef ds:uri="http://schemas.microsoft.com/office/2006/metadata/properties"/>
-    <ds:schemaRef ds:uri="http://schemas.microsoft.com/office/infopath/2007/PartnerControls"/>
-    <ds:schemaRef ds:uri="71af3243-3dd4-4a8d-8c0d-dd76da1f02a5"/>
+    <ds:schemaRef ds:uri="http://schemas.microsoft.com/sharepoint/v3/contenttype/forms"/>
   </ds:schemaRefs>
 </ds:datastoreItem>
 </file>
</xml_diff>

<commit_message>
Update Presentación - Club Padel.pptx
Añadido contenido al PowerPoint.
</commit_message>
<xml_diff>
--- a/Presentación - Club Padel.pptx
+++ b/Presentación - Club Padel.pptx
@@ -244,7 +244,7 @@
           <a:p>
             <a:fld id="{1CA5457B-CDAE-4DEB-AEC8-C82DE2312E37}" type="datetimeFigureOut">
               <a:rPr lang="en-US" smtClean="0"/>
-              <a:t>5/31/2021</a:t>
+              <a:t>6/8/2021</a:t>
             </a:fld>
             <a:endParaRPr lang="en-US" dirty="0"/>
           </a:p>
@@ -421,7 +421,7 @@
           <a:p>
             <a:fld id="{090B78EA-28CE-41D8-9043-90E391E5F567}" type="datetimeFigureOut">
               <a:rPr lang="en-US" noProof="0" smtClean="0"/>
-              <a:t>5/31/2021</a:t>
+              <a:t>6/8/2021</a:t>
             </a:fld>
             <a:endParaRPr lang="en-US" noProof="0" dirty="0"/>
           </a:p>
@@ -26368,6 +26368,26 @@
             </a:r>
           </a:p>
           <a:p>
+            <a:r>
+              <a:rPr lang="es-ES" dirty="0"/>
+              <a:t>Desarrollar una interfaz para reservar pista de forma válida.</a:t>
+            </a:r>
+          </a:p>
+          <a:p>
+            <a:r>
+              <a:rPr lang="es-ES" dirty="0"/>
+              <a:t>Listar con </a:t>
+            </a:r>
+            <a:r>
+              <a:rPr lang="es-ES" dirty="0" err="1"/>
+              <a:t>CardView</a:t>
+            </a:r>
+            <a:r>
+              <a:rPr lang="es-ES" dirty="0"/>
+              <a:t> una lista de objetos en Android Studio.</a:t>
+            </a:r>
+          </a:p>
+          <a:p>
             <a:endParaRPr lang="es-ES" dirty="0"/>
           </a:p>
         </p:txBody>
@@ -27379,14 +27399,6 @@
 </file>
 
 <file path=customXml/item1.xml><?xml version="1.0" encoding="utf-8"?>
-<p:properties xmlns:p="http://schemas.microsoft.com/office/2006/metadata/properties" xmlns:xsi="http://www.w3.org/2001/XMLSchema-instance" xmlns:pc="http://schemas.microsoft.com/office/infopath/2007/PartnerControls">
-  <documentManagement>
-    <MediaServiceKeyPoints xmlns="71af3243-3dd4-4a8d-8c0d-dd76da1f02a5" xsi:nil="true"/>
-  </documentManagement>
-</p:properties>
-</file>
-
-<file path=customXml/item2.xml><?xml version="1.0" encoding="utf-8"?>
 <ct:contentTypeSchema xmlns:ct="http://schemas.microsoft.com/office/2006/metadata/contentType" xmlns:ma="http://schemas.microsoft.com/office/2006/metadata/properties/metaAttributes" ct:_="" ma:_="" ma:contentTypeName="Document" ma:contentTypeID="0x01010079F111ED35F8CC479449609E8A0923A6" ma:contentTypeVersion="11" ma:contentTypeDescription="Create a new document." ma:contentTypeScope="" ma:versionID="96291512c1ee715ab617f4c07df79fc1">
   <xsd:schema xmlns:xsd="http://www.w3.org/2001/XMLSchema" xmlns:xs="http://www.w3.org/2001/XMLSchema" xmlns:p="http://schemas.microsoft.com/office/2006/metadata/properties" xmlns:ns2="71af3243-3dd4-4a8d-8c0d-dd76da1f02a5" xmlns:ns3="16c05727-aa75-4e4a-9b5f-8a80a1165891" targetNamespace="http://schemas.microsoft.com/office/2006/metadata/properties" ma:root="true" ma:fieldsID="8256c27c40ca5c40ce1cf6c44f0205df" ns2:_="" ns3:_="">
     <xsd:import namespace="71af3243-3dd4-4a8d-8c0d-dd76da1f02a5"/>
@@ -27597,6 +27609,14 @@
 </ct:contentTypeSchema>
 </file>
 
+<file path=customXml/item2.xml><?xml version="1.0" encoding="utf-8"?>
+<p:properties xmlns:p="http://schemas.microsoft.com/office/2006/metadata/properties" xmlns:xsi="http://www.w3.org/2001/XMLSchema-instance" xmlns:pc="http://schemas.microsoft.com/office/infopath/2007/PartnerControls">
+  <documentManagement>
+    <MediaServiceKeyPoints xmlns="71af3243-3dd4-4a8d-8c0d-dd76da1f02a5" xsi:nil="true"/>
+  </documentManagement>
+</p:properties>
+</file>
+
 <file path=customXml/item3.xml><?xml version="1.0" encoding="utf-8"?>
 <?mso-contentType ?>
 <FormTemplates xmlns="http://schemas.microsoft.com/sharepoint/v3/contenttype/forms">
@@ -27607,16 +27627,6 @@
 </file>
 
 <file path=customXml/itemProps1.xml><?xml version="1.0" encoding="utf-8"?>
-<ds:datastoreItem xmlns:ds="http://schemas.openxmlformats.org/officeDocument/2006/customXml" ds:itemID="{F5757914-1161-4661-9696-421FD6935CDD}">
-  <ds:schemaRefs>
-    <ds:schemaRef ds:uri="http://schemas.microsoft.com/office/2006/metadata/properties"/>
-    <ds:schemaRef ds:uri="http://schemas.microsoft.com/office/infopath/2007/PartnerControls"/>
-    <ds:schemaRef ds:uri="71af3243-3dd4-4a8d-8c0d-dd76da1f02a5"/>
-  </ds:schemaRefs>
-</ds:datastoreItem>
-</file>
-
-<file path=customXml/itemProps2.xml><?xml version="1.0" encoding="utf-8"?>
 <ds:datastoreItem xmlns:ds="http://schemas.openxmlformats.org/officeDocument/2006/customXml" ds:itemID="{4C103400-4A22-4E35-B588-4C4D42638959}">
   <ds:schemaRefs>
     <ds:schemaRef ds:uri="http://schemas.microsoft.com/office/2006/metadata/contentType"/>
@@ -27635,6 +27645,16 @@
 </ds:datastoreItem>
 </file>
 
+<file path=customXml/itemProps2.xml><?xml version="1.0" encoding="utf-8"?>
+<ds:datastoreItem xmlns:ds="http://schemas.openxmlformats.org/officeDocument/2006/customXml" ds:itemID="{F5757914-1161-4661-9696-421FD6935CDD}">
+  <ds:schemaRefs>
+    <ds:schemaRef ds:uri="http://schemas.microsoft.com/office/2006/metadata/properties"/>
+    <ds:schemaRef ds:uri="http://schemas.microsoft.com/office/infopath/2007/PartnerControls"/>
+    <ds:schemaRef ds:uri="71af3243-3dd4-4a8d-8c0d-dd76da1f02a5"/>
+  </ds:schemaRefs>
+</ds:datastoreItem>
+</file>
+
 <file path=customXml/itemProps3.xml><?xml version="1.0" encoding="utf-8"?>
 <ds:datastoreItem xmlns:ds="http://schemas.openxmlformats.org/officeDocument/2006/customXml" ds:itemID="{5B26E0C9-B2AA-42E6-97B6-E1B7D9EAF129}">
   <ds:schemaRefs>

</xml_diff>